<commit_message>
PP legendas nos graficos
</commit_message>
<xml_diff>
--- a/TP4/TP4 – Simulacao de Sistemas.pptx
+++ b/TP4/TP4 – Simulacao de Sistemas.pptx
@@ -5023,8 +5023,8 @@
           </a:p>
         </p:txBody>
       </p:sp>
-      <mc:AlternateContent xmlns:mc="http://schemas.openxmlformats.org/markup-compatibility/2006">
-        <mc:Choice xmlns:a14="http://schemas.microsoft.com/office/drawing/2010/main" Requires="a14">
+      <mc:AlternateContent xmlns:mc="http://schemas.openxmlformats.org/markup-compatibility/2006" xmlns:a14="http://schemas.microsoft.com/office/drawing/2010/main">
+        <mc:Choice Requires="a14">
           <p:sp>
             <p:nvSpPr>
               <p:cNvPr id="16" name="TextBox 15">
@@ -5578,7 +5578,7 @@
             </p:txBody>
           </p:sp>
         </mc:Choice>
-        <mc:Fallback>
+        <mc:Fallback xmlns="">
           <p:sp>
             <p:nvSpPr>
               <p:cNvPr id="16" name="TextBox 15">
@@ -6632,6 +6632,326 @@
           </a:p>
         </p:txBody>
       </p:sp>
+      <p:sp>
+        <p:nvSpPr>
+          <p:cNvPr id="2" name="TextBox 1">
+            <a:extLst>
+              <a:ext uri="{FF2B5EF4-FFF2-40B4-BE49-F238E27FC236}">
+                <a16:creationId xmlns:a16="http://schemas.microsoft.com/office/drawing/2014/main" id="{DB877C6F-C23A-A63E-F1CC-CED92D57D89D}"/>
+              </a:ext>
+            </a:extLst>
+          </p:cNvPr>
+          <p:cNvSpPr txBox="1"/>
+          <p:nvPr/>
+        </p:nvSpPr>
+        <p:spPr>
+          <a:xfrm>
+            <a:off x="2641061" y="3151113"/>
+            <a:ext cx="768159" cy="246221"/>
+          </a:xfrm>
+          <a:prstGeom prst="rect">
+            <a:avLst/>
+          </a:prstGeom>
+          <a:noFill/>
+        </p:spPr>
+        <p:txBody>
+          <a:bodyPr wrap="none" rtlCol="0">
+            <a:spAutoFit/>
+          </a:bodyPr>
+          <a:lstStyle/>
+          <a:p>
+            <a:r>
+              <a:rPr lang="en-US" sz="1000" dirty="0"/>
+              <a:t>Tempo </a:t>
+            </a:r>
+            <a:r>
+              <a:rPr lang="pt-PT" sz="1000" dirty="0"/>
+              <a:t>(s)</a:t>
+            </a:r>
+            <a:endParaRPr lang="en-US" sz="1000" dirty="0"/>
+          </a:p>
+        </p:txBody>
+      </p:sp>
+      <p:sp>
+        <p:nvSpPr>
+          <p:cNvPr id="17" name="TextBox 16">
+            <a:extLst>
+              <a:ext uri="{FF2B5EF4-FFF2-40B4-BE49-F238E27FC236}">
+                <a16:creationId xmlns:a16="http://schemas.microsoft.com/office/drawing/2014/main" id="{83DCAD41-D78D-D12F-7B5E-BFB16667C218}"/>
+              </a:ext>
+            </a:extLst>
+          </p:cNvPr>
+          <p:cNvSpPr txBox="1"/>
+          <p:nvPr/>
+        </p:nvSpPr>
+        <p:spPr>
+          <a:xfrm>
+            <a:off x="2568420" y="6657503"/>
+            <a:ext cx="768159" cy="246221"/>
+          </a:xfrm>
+          <a:prstGeom prst="rect">
+            <a:avLst/>
+          </a:prstGeom>
+          <a:noFill/>
+        </p:spPr>
+        <p:txBody>
+          <a:bodyPr wrap="none" rtlCol="0">
+            <a:spAutoFit/>
+          </a:bodyPr>
+          <a:lstStyle/>
+          <a:p>
+            <a:r>
+              <a:rPr lang="en-US" sz="1000" dirty="0"/>
+              <a:t>Tempo </a:t>
+            </a:r>
+            <a:r>
+              <a:rPr lang="pt-PT" sz="1000" dirty="0"/>
+              <a:t>(s)</a:t>
+            </a:r>
+            <a:endParaRPr lang="en-US" sz="1000" dirty="0"/>
+          </a:p>
+        </p:txBody>
+      </p:sp>
+      <p:sp>
+        <p:nvSpPr>
+          <p:cNvPr id="18" name="TextBox 17">
+            <a:extLst>
+              <a:ext uri="{FF2B5EF4-FFF2-40B4-BE49-F238E27FC236}">
+                <a16:creationId xmlns:a16="http://schemas.microsoft.com/office/drawing/2014/main" id="{8F6092A8-C7FA-BCDE-068D-6160EE2E9712}"/>
+              </a:ext>
+            </a:extLst>
+          </p:cNvPr>
+          <p:cNvSpPr txBox="1"/>
+          <p:nvPr/>
+        </p:nvSpPr>
+        <p:spPr>
+          <a:xfrm>
+            <a:off x="8855421" y="3151113"/>
+            <a:ext cx="768159" cy="246221"/>
+          </a:xfrm>
+          <a:prstGeom prst="rect">
+            <a:avLst/>
+          </a:prstGeom>
+          <a:noFill/>
+        </p:spPr>
+        <p:txBody>
+          <a:bodyPr wrap="none" rtlCol="0">
+            <a:spAutoFit/>
+          </a:bodyPr>
+          <a:lstStyle/>
+          <a:p>
+            <a:r>
+              <a:rPr lang="en-US" sz="1000" dirty="0"/>
+              <a:t>Tempo </a:t>
+            </a:r>
+            <a:r>
+              <a:rPr lang="pt-PT" sz="1000" dirty="0"/>
+              <a:t>(s)</a:t>
+            </a:r>
+            <a:endParaRPr lang="en-US" sz="1000" dirty="0"/>
+          </a:p>
+        </p:txBody>
+      </p:sp>
+      <p:sp>
+        <p:nvSpPr>
+          <p:cNvPr id="19" name="TextBox 18">
+            <a:extLst>
+              <a:ext uri="{FF2B5EF4-FFF2-40B4-BE49-F238E27FC236}">
+                <a16:creationId xmlns:a16="http://schemas.microsoft.com/office/drawing/2014/main" id="{3941E8EF-D8D8-22BE-93F7-113C100E27E3}"/>
+              </a:ext>
+            </a:extLst>
+          </p:cNvPr>
+          <p:cNvSpPr txBox="1"/>
+          <p:nvPr/>
+        </p:nvSpPr>
+        <p:spPr>
+          <a:xfrm>
+            <a:off x="8855421" y="6611779"/>
+            <a:ext cx="768159" cy="246221"/>
+          </a:xfrm>
+          <a:prstGeom prst="rect">
+            <a:avLst/>
+          </a:prstGeom>
+          <a:noFill/>
+        </p:spPr>
+        <p:txBody>
+          <a:bodyPr wrap="none" rtlCol="0">
+            <a:spAutoFit/>
+          </a:bodyPr>
+          <a:lstStyle/>
+          <a:p>
+            <a:r>
+              <a:rPr lang="en-US" sz="1000" dirty="0"/>
+              <a:t>Tempo </a:t>
+            </a:r>
+            <a:r>
+              <a:rPr lang="pt-PT" sz="1000" dirty="0"/>
+              <a:t>(s)</a:t>
+            </a:r>
+            <a:endParaRPr lang="en-US" sz="1000" dirty="0"/>
+          </a:p>
+        </p:txBody>
+      </p:sp>
+      <p:sp>
+        <p:nvSpPr>
+          <p:cNvPr id="20" name="TextBox 19">
+            <a:extLst>
+              <a:ext uri="{FF2B5EF4-FFF2-40B4-BE49-F238E27FC236}">
+                <a16:creationId xmlns:a16="http://schemas.microsoft.com/office/drawing/2014/main" id="{290A244F-D4F3-4550-21D8-91202D5784FF}"/>
+              </a:ext>
+            </a:extLst>
+          </p:cNvPr>
+          <p:cNvSpPr txBox="1"/>
+          <p:nvPr/>
+        </p:nvSpPr>
+        <p:spPr>
+          <a:xfrm rot="16200000">
+            <a:off x="205414" y="1622666"/>
+            <a:ext cx="833172" cy="276999"/>
+          </a:xfrm>
+          <a:prstGeom prst="rect">
+            <a:avLst/>
+          </a:prstGeom>
+          <a:noFill/>
+        </p:spPr>
+        <p:txBody>
+          <a:bodyPr wrap="square" rtlCol="0">
+            <a:spAutoFit/>
+          </a:bodyPr>
+          <a:lstStyle/>
+          <a:p>
+            <a:r>
+              <a:rPr lang="en-US" sz="1200" dirty="0" err="1"/>
+              <a:t>Nível</a:t>
+            </a:r>
+            <a:r>
+              <a:rPr lang="en-US" sz="1200" dirty="0"/>
+              <a:t> (m)</a:t>
+            </a:r>
+            <a:endParaRPr lang="pt-PT" sz="1200" dirty="0"/>
+          </a:p>
+        </p:txBody>
+      </p:sp>
+      <p:sp>
+        <p:nvSpPr>
+          <p:cNvPr id="21" name="TextBox 20">
+            <a:extLst>
+              <a:ext uri="{FF2B5EF4-FFF2-40B4-BE49-F238E27FC236}">
+                <a16:creationId xmlns:a16="http://schemas.microsoft.com/office/drawing/2014/main" id="{F0E53009-B29C-0354-7B7B-3F9BC2860377}"/>
+              </a:ext>
+            </a:extLst>
+          </p:cNvPr>
+          <p:cNvSpPr txBox="1"/>
+          <p:nvPr/>
+        </p:nvSpPr>
+        <p:spPr>
+          <a:xfrm rot="16200000">
+            <a:off x="6527818" y="1622667"/>
+            <a:ext cx="833172" cy="276999"/>
+          </a:xfrm>
+          <a:prstGeom prst="rect">
+            <a:avLst/>
+          </a:prstGeom>
+          <a:noFill/>
+        </p:spPr>
+        <p:txBody>
+          <a:bodyPr wrap="square" rtlCol="0">
+            <a:spAutoFit/>
+          </a:bodyPr>
+          <a:lstStyle/>
+          <a:p>
+            <a:r>
+              <a:rPr lang="en-US" sz="1200" dirty="0" err="1"/>
+              <a:t>Nível</a:t>
+            </a:r>
+            <a:r>
+              <a:rPr lang="en-US" sz="1200" dirty="0"/>
+              <a:t> (m)</a:t>
+            </a:r>
+            <a:endParaRPr lang="pt-PT" sz="1200" dirty="0"/>
+          </a:p>
+        </p:txBody>
+      </p:sp>
+      <p:sp>
+        <p:nvSpPr>
+          <p:cNvPr id="22" name="TextBox 21">
+            <a:extLst>
+              <a:ext uri="{FF2B5EF4-FFF2-40B4-BE49-F238E27FC236}">
+                <a16:creationId xmlns:a16="http://schemas.microsoft.com/office/drawing/2014/main" id="{ACB65D0F-6415-024E-8BCE-A5EB1DA2C9C9}"/>
+              </a:ext>
+            </a:extLst>
+          </p:cNvPr>
+          <p:cNvSpPr txBox="1"/>
+          <p:nvPr/>
+        </p:nvSpPr>
+        <p:spPr>
+          <a:xfrm rot="16200000">
+            <a:off x="6527817" y="5128215"/>
+            <a:ext cx="833172" cy="276999"/>
+          </a:xfrm>
+          <a:prstGeom prst="rect">
+            <a:avLst/>
+          </a:prstGeom>
+          <a:noFill/>
+        </p:spPr>
+        <p:txBody>
+          <a:bodyPr wrap="square" rtlCol="0">
+            <a:spAutoFit/>
+          </a:bodyPr>
+          <a:lstStyle/>
+          <a:p>
+            <a:r>
+              <a:rPr lang="en-US" sz="1200" dirty="0" err="1"/>
+              <a:t>Nível</a:t>
+            </a:r>
+            <a:r>
+              <a:rPr lang="en-US" sz="1200" dirty="0"/>
+              <a:t> (m)</a:t>
+            </a:r>
+            <a:endParaRPr lang="pt-PT" sz="1200" dirty="0"/>
+          </a:p>
+        </p:txBody>
+      </p:sp>
+      <p:sp>
+        <p:nvSpPr>
+          <p:cNvPr id="23" name="TextBox 22">
+            <a:extLst>
+              <a:ext uri="{FF2B5EF4-FFF2-40B4-BE49-F238E27FC236}">
+                <a16:creationId xmlns:a16="http://schemas.microsoft.com/office/drawing/2014/main" id="{E1D4F8B2-92AA-CA8F-DBC3-D53C09508C96}"/>
+              </a:ext>
+            </a:extLst>
+          </p:cNvPr>
+          <p:cNvSpPr txBox="1"/>
+          <p:nvPr/>
+        </p:nvSpPr>
+        <p:spPr>
+          <a:xfrm rot="16200000">
+            <a:off x="205414" y="5128216"/>
+            <a:ext cx="833172" cy="276999"/>
+          </a:xfrm>
+          <a:prstGeom prst="rect">
+            <a:avLst/>
+          </a:prstGeom>
+          <a:noFill/>
+        </p:spPr>
+        <p:txBody>
+          <a:bodyPr wrap="square" rtlCol="0">
+            <a:spAutoFit/>
+          </a:bodyPr>
+          <a:lstStyle/>
+          <a:p>
+            <a:r>
+              <a:rPr lang="en-US" sz="1200" dirty="0" err="1"/>
+              <a:t>Nível</a:t>
+            </a:r>
+            <a:r>
+              <a:rPr lang="en-US" sz="1200" dirty="0"/>
+              <a:t> (m)</a:t>
+            </a:r>
+            <a:endParaRPr lang="pt-PT" sz="1200" dirty="0"/>
+          </a:p>
+        </p:txBody>
+      </p:sp>
     </p:spTree>
     <p:extLst>
       <p:ext uri="{BB962C8B-B14F-4D97-AF65-F5344CB8AC3E}">
@@ -7149,6 +7469,326 @@
               <a:rPr lang="pt-PT" dirty="0"/>
               <a:t>Tarefa 9</a:t>
             </a:r>
+          </a:p>
+        </p:txBody>
+      </p:sp>
+      <p:sp>
+        <p:nvSpPr>
+          <p:cNvPr id="13" name="TextBox 12">
+            <a:extLst>
+              <a:ext uri="{FF2B5EF4-FFF2-40B4-BE49-F238E27FC236}">
+                <a16:creationId xmlns:a16="http://schemas.microsoft.com/office/drawing/2014/main" id="{6556F6BB-A45E-62CF-24A7-0FCA4654C482}"/>
+              </a:ext>
+            </a:extLst>
+          </p:cNvPr>
+          <p:cNvSpPr txBox="1"/>
+          <p:nvPr/>
+        </p:nvSpPr>
+        <p:spPr>
+          <a:xfrm>
+            <a:off x="9128760" y="6611779"/>
+            <a:ext cx="768159" cy="246221"/>
+          </a:xfrm>
+          <a:prstGeom prst="rect">
+            <a:avLst/>
+          </a:prstGeom>
+          <a:noFill/>
+        </p:spPr>
+        <p:txBody>
+          <a:bodyPr wrap="none" rtlCol="0">
+            <a:spAutoFit/>
+          </a:bodyPr>
+          <a:lstStyle/>
+          <a:p>
+            <a:r>
+              <a:rPr lang="en-US" sz="1000" dirty="0"/>
+              <a:t>Tempo </a:t>
+            </a:r>
+            <a:r>
+              <a:rPr lang="pt-PT" sz="1000" dirty="0"/>
+              <a:t>(s)</a:t>
+            </a:r>
+            <a:endParaRPr lang="en-US" sz="1000" dirty="0"/>
+          </a:p>
+        </p:txBody>
+      </p:sp>
+      <p:sp>
+        <p:nvSpPr>
+          <p:cNvPr id="14" name="TextBox 13">
+            <a:extLst>
+              <a:ext uri="{FF2B5EF4-FFF2-40B4-BE49-F238E27FC236}">
+                <a16:creationId xmlns:a16="http://schemas.microsoft.com/office/drawing/2014/main" id="{7A189C06-6C87-0B1A-8780-169E11039561}"/>
+              </a:ext>
+            </a:extLst>
+          </p:cNvPr>
+          <p:cNvSpPr txBox="1"/>
+          <p:nvPr/>
+        </p:nvSpPr>
+        <p:spPr>
+          <a:xfrm>
+            <a:off x="8962062" y="3228499"/>
+            <a:ext cx="768159" cy="246221"/>
+          </a:xfrm>
+          <a:prstGeom prst="rect">
+            <a:avLst/>
+          </a:prstGeom>
+          <a:noFill/>
+        </p:spPr>
+        <p:txBody>
+          <a:bodyPr wrap="none" rtlCol="0">
+            <a:spAutoFit/>
+          </a:bodyPr>
+          <a:lstStyle/>
+          <a:p>
+            <a:r>
+              <a:rPr lang="en-US" sz="1000" dirty="0"/>
+              <a:t>Tempo </a:t>
+            </a:r>
+            <a:r>
+              <a:rPr lang="pt-PT" sz="1000" dirty="0"/>
+              <a:t>(s)</a:t>
+            </a:r>
+            <a:endParaRPr lang="en-US" sz="1000" dirty="0"/>
+          </a:p>
+        </p:txBody>
+      </p:sp>
+      <p:sp>
+        <p:nvSpPr>
+          <p:cNvPr id="15" name="TextBox 14">
+            <a:extLst>
+              <a:ext uri="{FF2B5EF4-FFF2-40B4-BE49-F238E27FC236}">
+                <a16:creationId xmlns:a16="http://schemas.microsoft.com/office/drawing/2014/main" id="{87D02B33-392B-E212-2929-8EBCE8135340}"/>
+              </a:ext>
+            </a:extLst>
+          </p:cNvPr>
+          <p:cNvSpPr txBox="1"/>
+          <p:nvPr/>
+        </p:nvSpPr>
+        <p:spPr>
+          <a:xfrm>
+            <a:off x="2491241" y="3166948"/>
+            <a:ext cx="768159" cy="246221"/>
+          </a:xfrm>
+          <a:prstGeom prst="rect">
+            <a:avLst/>
+          </a:prstGeom>
+          <a:noFill/>
+        </p:spPr>
+        <p:txBody>
+          <a:bodyPr wrap="none" rtlCol="0">
+            <a:spAutoFit/>
+          </a:bodyPr>
+          <a:lstStyle/>
+          <a:p>
+            <a:r>
+              <a:rPr lang="en-US" sz="1000" dirty="0"/>
+              <a:t>Tempo </a:t>
+            </a:r>
+            <a:r>
+              <a:rPr lang="pt-PT" sz="1000" dirty="0"/>
+              <a:t>(s)</a:t>
+            </a:r>
+            <a:endParaRPr lang="en-US" sz="1000" dirty="0"/>
+          </a:p>
+        </p:txBody>
+      </p:sp>
+      <p:sp>
+        <p:nvSpPr>
+          <p:cNvPr id="17" name="TextBox 16">
+            <a:extLst>
+              <a:ext uri="{FF2B5EF4-FFF2-40B4-BE49-F238E27FC236}">
+                <a16:creationId xmlns:a16="http://schemas.microsoft.com/office/drawing/2014/main" id="{C67DA086-03B1-11E5-EAF7-5C7892832088}"/>
+              </a:ext>
+            </a:extLst>
+          </p:cNvPr>
+          <p:cNvSpPr txBox="1"/>
+          <p:nvPr/>
+        </p:nvSpPr>
+        <p:spPr>
+          <a:xfrm>
+            <a:off x="2607907" y="6592505"/>
+            <a:ext cx="768159" cy="246221"/>
+          </a:xfrm>
+          <a:prstGeom prst="rect">
+            <a:avLst/>
+          </a:prstGeom>
+          <a:noFill/>
+        </p:spPr>
+        <p:txBody>
+          <a:bodyPr wrap="none" rtlCol="0">
+            <a:spAutoFit/>
+          </a:bodyPr>
+          <a:lstStyle/>
+          <a:p>
+            <a:r>
+              <a:rPr lang="en-US" sz="1000" dirty="0"/>
+              <a:t>Tempo </a:t>
+            </a:r>
+            <a:r>
+              <a:rPr lang="pt-PT" sz="1000" dirty="0"/>
+              <a:t>(s)</a:t>
+            </a:r>
+            <a:endParaRPr lang="en-US" sz="1000" dirty="0"/>
+          </a:p>
+        </p:txBody>
+      </p:sp>
+      <p:sp>
+        <p:nvSpPr>
+          <p:cNvPr id="2" name="TextBox 1">
+            <a:extLst>
+              <a:ext uri="{FF2B5EF4-FFF2-40B4-BE49-F238E27FC236}">
+                <a16:creationId xmlns:a16="http://schemas.microsoft.com/office/drawing/2014/main" id="{19DEDB86-A745-9771-7053-C904A5558C6E}"/>
+              </a:ext>
+            </a:extLst>
+          </p:cNvPr>
+          <p:cNvSpPr txBox="1"/>
+          <p:nvPr/>
+        </p:nvSpPr>
+        <p:spPr>
+          <a:xfrm rot="16200000">
+            <a:off x="6607338" y="1707366"/>
+            <a:ext cx="803425" cy="276999"/>
+          </a:xfrm>
+          <a:prstGeom prst="rect">
+            <a:avLst/>
+          </a:prstGeom>
+          <a:noFill/>
+        </p:spPr>
+        <p:txBody>
+          <a:bodyPr wrap="none" rtlCol="0">
+            <a:spAutoFit/>
+          </a:bodyPr>
+          <a:lstStyle/>
+          <a:p>
+            <a:r>
+              <a:rPr lang="en-US" sz="1200" dirty="0" err="1"/>
+              <a:t>Nível</a:t>
+            </a:r>
+            <a:r>
+              <a:rPr lang="en-US" sz="1200" dirty="0"/>
+              <a:t> (m)</a:t>
+            </a:r>
+            <a:endParaRPr lang="pt-PT" sz="1200" dirty="0"/>
+          </a:p>
+        </p:txBody>
+      </p:sp>
+      <p:sp>
+        <p:nvSpPr>
+          <p:cNvPr id="19" name="TextBox 18">
+            <a:extLst>
+              <a:ext uri="{FF2B5EF4-FFF2-40B4-BE49-F238E27FC236}">
+                <a16:creationId xmlns:a16="http://schemas.microsoft.com/office/drawing/2014/main" id="{A6170E5F-A452-71BE-A434-F979AE138633}"/>
+              </a:ext>
+            </a:extLst>
+          </p:cNvPr>
+          <p:cNvSpPr txBox="1"/>
+          <p:nvPr/>
+        </p:nvSpPr>
+        <p:spPr>
+          <a:xfrm rot="16200000">
+            <a:off x="254611" y="5112874"/>
+            <a:ext cx="803425" cy="276999"/>
+          </a:xfrm>
+          <a:prstGeom prst="rect">
+            <a:avLst/>
+          </a:prstGeom>
+          <a:noFill/>
+        </p:spPr>
+        <p:txBody>
+          <a:bodyPr wrap="none" rtlCol="0">
+            <a:spAutoFit/>
+          </a:bodyPr>
+          <a:lstStyle/>
+          <a:p>
+            <a:r>
+              <a:rPr lang="en-US" sz="1200" dirty="0" err="1"/>
+              <a:t>Nível</a:t>
+            </a:r>
+            <a:r>
+              <a:rPr lang="en-US" sz="1200" dirty="0"/>
+              <a:t> (m)</a:t>
+            </a:r>
+            <a:endParaRPr lang="pt-PT" sz="1200" dirty="0"/>
+          </a:p>
+        </p:txBody>
+      </p:sp>
+      <p:sp>
+        <p:nvSpPr>
+          <p:cNvPr id="22" name="TextBox 21">
+            <a:extLst>
+              <a:ext uri="{FF2B5EF4-FFF2-40B4-BE49-F238E27FC236}">
+                <a16:creationId xmlns:a16="http://schemas.microsoft.com/office/drawing/2014/main" id="{85BBC23F-C06E-FECA-0829-177BE19806BA}"/>
+              </a:ext>
+            </a:extLst>
+          </p:cNvPr>
+          <p:cNvSpPr txBox="1"/>
+          <p:nvPr/>
+        </p:nvSpPr>
+        <p:spPr>
+          <a:xfrm rot="16200000">
+            <a:off x="299801" y="1703016"/>
+            <a:ext cx="803425" cy="276999"/>
+          </a:xfrm>
+          <a:prstGeom prst="rect">
+            <a:avLst/>
+          </a:prstGeom>
+          <a:noFill/>
+        </p:spPr>
+        <p:txBody>
+          <a:bodyPr wrap="none" rtlCol="0">
+            <a:spAutoFit/>
+          </a:bodyPr>
+          <a:lstStyle/>
+          <a:p>
+            <a:r>
+              <a:rPr lang="en-US" sz="1200" dirty="0" err="1"/>
+              <a:t>Nível</a:t>
+            </a:r>
+            <a:r>
+              <a:rPr lang="en-US" sz="1200" dirty="0"/>
+              <a:t> (m)</a:t>
+            </a:r>
+            <a:endParaRPr lang="pt-PT" sz="1200" dirty="0"/>
+          </a:p>
+        </p:txBody>
+      </p:sp>
+      <p:sp>
+        <p:nvSpPr>
+          <p:cNvPr id="24" name="TextBox 23">
+            <a:extLst>
+              <a:ext uri="{FF2B5EF4-FFF2-40B4-BE49-F238E27FC236}">
+                <a16:creationId xmlns:a16="http://schemas.microsoft.com/office/drawing/2014/main" id="{DCE779F4-348D-B860-E202-CD9EE470E2EB}"/>
+              </a:ext>
+            </a:extLst>
+          </p:cNvPr>
+          <p:cNvSpPr txBox="1"/>
+          <p:nvPr/>
+        </p:nvSpPr>
+        <p:spPr>
+          <a:xfrm rot="16200000">
+            <a:off x="6607338" y="5112874"/>
+            <a:ext cx="803425" cy="276999"/>
+          </a:xfrm>
+          <a:prstGeom prst="rect">
+            <a:avLst/>
+          </a:prstGeom>
+          <a:noFill/>
+        </p:spPr>
+        <p:txBody>
+          <a:bodyPr wrap="none" rtlCol="0">
+            <a:spAutoFit/>
+          </a:bodyPr>
+          <a:lstStyle/>
+          <a:p>
+            <a:r>
+              <a:rPr lang="en-US" sz="1200" dirty="0" err="1"/>
+              <a:t>Nível</a:t>
+            </a:r>
+            <a:r>
+              <a:rPr lang="en-US" sz="1200" dirty="0"/>
+              <a:t> (m)</a:t>
+            </a:r>
+            <a:endParaRPr lang="pt-PT" sz="1200" dirty="0"/>
           </a:p>
         </p:txBody>
       </p:sp>

</xml_diff>